<commit_message>
Adding ThreadSafety, Concurrent collections code samples, materials
</commit_message>
<xml_diff>
--- a/CORE JAVA/MATERIALS/Java-Threads-and-Synchronization.pptx
+++ b/CORE JAVA/MATERIALS/Java-Threads-and-Synchronization.pptx
@@ -36,6 +36,18 @@
     <p:sldId id="296" r:id="rId31"/>
     <p:sldId id="297" r:id="rId32"/>
     <p:sldId id="298" r:id="rId33"/>
+    <p:sldId id="307" r:id="rId34"/>
+    <p:sldId id="308" r:id="rId35"/>
+    <p:sldId id="309" r:id="rId36"/>
+    <p:sldId id="310" r:id="rId37"/>
+    <p:sldId id="311" r:id="rId38"/>
+    <p:sldId id="312" r:id="rId39"/>
+    <p:sldId id="313" r:id="rId40"/>
+    <p:sldId id="314" r:id="rId41"/>
+    <p:sldId id="315" r:id="rId42"/>
+    <p:sldId id="316" r:id="rId43"/>
+    <p:sldId id="317" r:id="rId44"/>
+    <p:sldId id="318" r:id="rId45"/>
   </p:sldIdLst>
   <p:sldSz cx="9144000" cy="6858000" type="screen4x3"/>
   <p:notesSz cx="6858000" cy="9144000"/>
@@ -3894,9 +3906,7 @@
             <p:ph type="ctrTitle"/>
           </p:nvPr>
         </p:nvSpPr>
-        <p:spPr>
-          <a:ln/>
-        </p:spPr>
+        <p:spPr/>
         <p:txBody>
           <a:bodyPr anchor="b" anchorCtr="0"/>
           <a:p>
@@ -3932,7 +3942,6 @@
             <a:off x="1371600" y="3505200"/>
             <a:ext cx="6400800" cy="2438400"/>
           </a:xfrm>
-          <a:ln/>
         </p:spPr>
         <p:txBody>
           <a:bodyPr anchor="t" anchorCtr="0"/>
@@ -4014,9 +4023,7 @@
             <p:ph type="title"/>
           </p:nvPr>
         </p:nvSpPr>
-        <p:spPr>
-          <a:ln/>
-        </p:spPr>
+        <p:spPr/>
         <p:txBody>
           <a:bodyPr anchor="b" anchorCtr="0"/>
           <a:p>
@@ -4038,9 +4045,7 @@
             <p:ph type="body" idx="1"/>
           </p:nvPr>
         </p:nvSpPr>
-        <p:spPr>
-          <a:ln/>
-        </p:spPr>
+        <p:spPr/>
         <p:txBody>
           <a:bodyPr/>
           <a:p>
@@ -4118,9 +4123,7 @@
             <p:ph type="title"/>
           </p:nvPr>
         </p:nvSpPr>
-        <p:spPr>
-          <a:ln/>
-        </p:spPr>
+        <p:spPr/>
         <p:txBody>
           <a:bodyPr anchor="b" anchorCtr="0"/>
           <a:p>
@@ -4142,9 +4145,7 @@
             <p:ph type="body" idx="1"/>
           </p:nvPr>
         </p:nvSpPr>
-        <p:spPr>
-          <a:ln/>
-        </p:spPr>
+        <p:spPr/>
         <p:txBody>
           <a:bodyPr/>
           <a:p>
@@ -4239,9 +4240,7 @@
             <p:ph type="title"/>
           </p:nvPr>
         </p:nvSpPr>
-        <p:spPr>
-          <a:ln/>
-        </p:spPr>
+        <p:spPr/>
         <p:txBody>
           <a:bodyPr anchor="b" anchorCtr="0"/>
           <a:p>
@@ -4263,9 +4262,7 @@
             <p:ph type="body" idx="1"/>
           </p:nvPr>
         </p:nvSpPr>
-        <p:spPr>
-          <a:ln/>
-        </p:spPr>
+        <p:spPr/>
         <p:txBody>
           <a:bodyPr/>
           <a:p>
@@ -4291,6 +4288,7 @@
               <a:rPr sz="2000"/>
               <a:t> thread interrupts the thread calling the blocking method. The other thread interrupts the blocking/sleeping thread by calling interrupt() on it.</a:t>
             </a:r>
+            <a:endParaRPr sz="2000"/>
           </a:p>
         </p:txBody>
       </p:sp>
@@ -4322,9 +4320,7 @@
             <p:ph type="title"/>
           </p:nvPr>
         </p:nvSpPr>
-        <p:spPr>
-          <a:ln/>
-        </p:spPr>
+        <p:spPr/>
         <p:txBody>
           <a:bodyPr anchor="b" anchorCtr="0"/>
           <a:p>
@@ -4344,9 +4340,7 @@
             <p:ph type="body" idx="1"/>
           </p:nvPr>
         </p:nvSpPr>
-        <p:spPr>
-          <a:ln/>
-        </p:spPr>
+        <p:spPr/>
         <p:txBody>
           <a:bodyPr/>
           <a:p>
@@ -4411,9 +4405,7 @@
             <p:ph type="title"/>
           </p:nvPr>
         </p:nvSpPr>
-        <p:spPr>
-          <a:ln/>
-        </p:spPr>
+        <p:spPr/>
         <p:txBody>
           <a:bodyPr anchor="b" anchorCtr="0"/>
           <a:p>
@@ -4421,6 +4413,7 @@
               <a:rPr lang="en-AU" altLang="en-AU"/>
               <a:t>Java Threads &amp; Synchronization</a:t>
             </a:r>
+            <a:endParaRPr lang="en-AU" altLang="en-AU"/>
           </a:p>
         </p:txBody>
       </p:sp>
@@ -4434,9 +4427,7 @@
             <p:ph type="body" idx="1"/>
           </p:nvPr>
         </p:nvSpPr>
-        <p:spPr>
-          <a:ln/>
-        </p:spPr>
+        <p:spPr/>
         <p:txBody>
           <a:bodyPr/>
           <a:p>
@@ -4541,8 +4532,13 @@
               </a:rPr>
               <a:t>Assignment</a:t>
             </a:r>
-          </a:p>
-          <a:p/>
+            <a:endParaRPr lang="en-GB" altLang="x-none" sz="2400">
+              <a:ea typeface="SimSun" panose="02010600030101010101" pitchFamily="2" charset="-122"/>
+            </a:endParaRPr>
+          </a:p>
+          <a:p>
+            <a:endParaRPr sz="2400"/>
+          </a:p>
         </p:txBody>
       </p:sp>
     </p:spTree>
@@ -4573,9 +4569,7 @@
             <p:ph type="title"/>
           </p:nvPr>
         </p:nvSpPr>
-        <p:spPr>
-          <a:ln/>
-        </p:spPr>
+        <p:spPr/>
         <p:txBody>
           <a:bodyPr anchor="b" anchorCtr="0"/>
           <a:p>
@@ -4595,9 +4589,7 @@
             <p:ph type="body" idx="1"/>
           </p:nvPr>
         </p:nvSpPr>
-        <p:spPr>
-          <a:ln/>
-        </p:spPr>
+        <p:spPr/>
         <p:txBody>
           <a:bodyPr/>
           <a:p>
@@ -4663,9 +4655,7 @@
             <p:ph type="title"/>
           </p:nvPr>
         </p:nvSpPr>
-        <p:spPr>
-          <a:ln/>
-        </p:spPr>
+        <p:spPr/>
         <p:txBody>
           <a:bodyPr anchor="b" anchorCtr="0"/>
           <a:p>
@@ -4687,9 +4677,7 @@
             <p:ph type="body" idx="1"/>
           </p:nvPr>
         </p:nvSpPr>
-        <p:spPr>
-          <a:ln/>
-        </p:spPr>
+        <p:spPr/>
         <p:txBody>
           <a:bodyPr/>
           <a:p>
@@ -4784,9 +4772,7 @@
             <p:ph type="title"/>
           </p:nvPr>
         </p:nvSpPr>
-        <p:spPr>
-          <a:ln/>
-        </p:spPr>
+        <p:spPr/>
         <p:txBody>
           <a:bodyPr anchor="b" anchorCtr="0"/>
           <a:p>
@@ -4808,9 +4794,7 @@
             <p:ph type="body" idx="1"/>
           </p:nvPr>
         </p:nvSpPr>
-        <p:spPr>
-          <a:ln/>
-        </p:spPr>
+        <p:spPr/>
         <p:txBody>
           <a:bodyPr/>
           <a:p>
@@ -5004,9 +4988,7 @@
             <p:ph type="title"/>
           </p:nvPr>
         </p:nvSpPr>
-        <p:spPr>
-          <a:ln/>
-        </p:spPr>
+        <p:spPr/>
         <p:txBody>
           <a:bodyPr anchor="b" anchorCtr="0"/>
           <a:p>
@@ -5028,9 +5010,7 @@
             <p:ph type="body" idx="1"/>
           </p:nvPr>
         </p:nvSpPr>
-        <p:spPr>
-          <a:ln/>
-        </p:spPr>
+        <p:spPr/>
         <p:txBody>
           <a:bodyPr/>
           <a:p>
@@ -5173,9 +5153,7 @@
             <p:ph type="title"/>
           </p:nvPr>
         </p:nvSpPr>
-        <p:spPr>
-          <a:ln/>
-        </p:spPr>
+        <p:spPr/>
         <p:txBody>
           <a:bodyPr anchor="b" anchorCtr="0"/>
           <a:p>
@@ -5202,7 +5180,6 @@
             <a:off x="1182688" y="1981200"/>
             <a:ext cx="7772400" cy="4114800"/>
           </a:xfrm>
-          <a:ln/>
         </p:spPr>
         <p:txBody>
           <a:bodyPr/>
@@ -5324,9 +5301,7 @@
             <p:ph type="title"/>
           </p:nvPr>
         </p:nvSpPr>
-        <p:spPr>
-          <a:ln/>
-        </p:spPr>
+        <p:spPr/>
         <p:txBody>
           <a:bodyPr anchor="b" anchorCtr="0"/>
           <a:p>
@@ -5347,9 +5322,7 @@
             <p:ph type="body" idx="1"/>
           </p:nvPr>
         </p:nvSpPr>
-        <p:spPr>
-          <a:ln/>
-        </p:spPr>
+        <p:spPr/>
         <p:txBody>
           <a:bodyPr/>
           <a:p>
@@ -5472,9 +5445,7 @@
             <p:ph type="title"/>
           </p:nvPr>
         </p:nvSpPr>
-        <p:spPr>
-          <a:ln/>
-        </p:spPr>
+        <p:spPr/>
         <p:txBody>
           <a:bodyPr anchor="b" anchorCtr="0"/>
           <a:p>
@@ -5482,6 +5453,7 @@
               <a:rPr lang="en-AU" altLang="en-AU"/>
               <a:t>Java Threads &amp; Synchronization</a:t>
             </a:r>
+            <a:endParaRPr lang="en-AU" altLang="en-AU"/>
           </a:p>
         </p:txBody>
       </p:sp>
@@ -5495,9 +5467,7 @@
             <p:ph type="body" idx="1"/>
           </p:nvPr>
         </p:nvSpPr>
-        <p:spPr>
-          <a:ln/>
-        </p:spPr>
+        <p:spPr/>
         <p:txBody>
           <a:bodyPr/>
           <a:p>
@@ -5640,9 +5610,7 @@
             <p:ph type="title"/>
           </p:nvPr>
         </p:nvSpPr>
-        <p:spPr>
-          <a:ln/>
-        </p:spPr>
+        <p:spPr/>
         <p:txBody>
           <a:bodyPr anchor="b" anchorCtr="0"/>
           <a:p>
@@ -5671,7 +5639,6 @@
             <a:off x="914400" y="2057400"/>
             <a:ext cx="7772400" cy="4114800"/>
           </a:xfrm>
-          <a:ln/>
         </p:spPr>
         <p:txBody>
           <a:bodyPr/>
@@ -5806,9 +5773,7 @@
             <p:ph type="title"/>
           </p:nvPr>
         </p:nvSpPr>
-        <p:spPr>
-          <a:ln/>
-        </p:spPr>
+        <p:spPr/>
         <p:txBody>
           <a:bodyPr anchor="b" anchorCtr="0"/>
           <a:p>
@@ -5830,9 +5795,7 @@
             <p:ph type="body" idx="1"/>
           </p:nvPr>
         </p:nvSpPr>
-        <p:spPr>
-          <a:ln/>
-        </p:spPr>
+        <p:spPr/>
         <p:txBody>
           <a:bodyPr/>
           <a:p>
@@ -5958,9 +5921,7 @@
             <p:ph type="title"/>
           </p:nvPr>
         </p:nvSpPr>
-        <p:spPr>
-          <a:ln/>
-        </p:spPr>
+        <p:spPr/>
         <p:txBody>
           <a:bodyPr anchor="b" anchorCtr="0"/>
           <a:p>
@@ -5968,6 +5929,7 @@
               <a:rPr lang="en-AU" altLang="en-AU"/>
               <a:t>Java Threads &amp; Synchronization</a:t>
             </a:r>
+            <a:endParaRPr lang="en-AU" altLang="en-AU"/>
           </a:p>
         </p:txBody>
       </p:sp>
@@ -5981,9 +5943,7 @@
             <p:ph type="body" idx="1"/>
           </p:nvPr>
         </p:nvSpPr>
-        <p:spPr>
-          <a:ln/>
-        </p:spPr>
+        <p:spPr/>
         <p:txBody>
           <a:bodyPr/>
           <a:p>
@@ -6123,6 +6083,9 @@
               </a:rPr>
               <a:t>Assignment</a:t>
             </a:r>
+            <a:endParaRPr lang="en-GB" altLang="x-none" sz="2400">
+              <a:ea typeface="SimSun" panose="02010600030101010101" pitchFamily="2" charset="-122"/>
+            </a:endParaRPr>
           </a:p>
           <a:p>
             <a:pPr>
@@ -6159,9 +6122,7 @@
             <p:ph type="title"/>
           </p:nvPr>
         </p:nvSpPr>
-        <p:spPr>
-          <a:ln/>
-        </p:spPr>
+        <p:spPr/>
         <p:txBody>
           <a:bodyPr anchor="b" anchorCtr="0"/>
           <a:p>
@@ -6181,9 +6142,7 @@
             <p:ph type="body" idx="1"/>
           </p:nvPr>
         </p:nvSpPr>
-        <p:spPr>
-          <a:ln/>
-        </p:spPr>
+        <p:spPr/>
         <p:txBody>
           <a:bodyPr/>
           <a:p>
@@ -6233,9 +6192,7 @@
             <p:ph type="title"/>
           </p:nvPr>
         </p:nvSpPr>
-        <p:spPr>
-          <a:ln/>
-        </p:spPr>
+        <p:spPr/>
         <p:txBody>
           <a:bodyPr anchor="b" anchorCtr="0"/>
           <a:p>
@@ -6255,9 +6212,7 @@
             <p:ph type="body" idx="1"/>
           </p:nvPr>
         </p:nvSpPr>
-        <p:spPr>
-          <a:ln/>
-        </p:spPr>
+        <p:spPr/>
         <p:txBody>
           <a:bodyPr/>
           <a:p>
@@ -6463,9 +6418,7 @@
             <p:ph type="title"/>
           </p:nvPr>
         </p:nvSpPr>
-        <p:spPr>
-          <a:ln/>
-        </p:spPr>
+        <p:spPr/>
         <p:txBody>
           <a:bodyPr anchor="b" anchorCtr="0"/>
           <a:p>
@@ -6485,9 +6438,7 @@
             <p:ph type="body" idx="1"/>
           </p:nvPr>
         </p:nvSpPr>
-        <p:spPr>
-          <a:ln/>
-        </p:spPr>
+        <p:spPr/>
         <p:txBody>
           <a:bodyPr/>
           <a:p>
@@ -6774,9 +6725,7 @@
             <p:ph type="title"/>
           </p:nvPr>
         </p:nvSpPr>
-        <p:spPr>
-          <a:ln/>
-        </p:spPr>
+        <p:spPr/>
         <p:txBody>
           <a:bodyPr anchor="b" anchorCtr="0"/>
           <a:p>
@@ -6784,6 +6733,7 @@
               <a:rPr lang="en-AU" altLang="en-AU"/>
               <a:t>Java Threads &amp; Synchronization</a:t>
             </a:r>
+            <a:endParaRPr lang="en-AU" altLang="en-AU"/>
           </a:p>
         </p:txBody>
       </p:sp>
@@ -6797,9 +6747,7 @@
             <p:ph type="body" idx="1"/>
           </p:nvPr>
         </p:nvSpPr>
-        <p:spPr>
-          <a:ln/>
-        </p:spPr>
+        <p:spPr/>
         <p:txBody>
           <a:bodyPr/>
           <a:p>
@@ -6946,9 +6894,7 @@
             <p:ph type="title"/>
           </p:nvPr>
         </p:nvSpPr>
-        <p:spPr>
-          <a:ln/>
-        </p:spPr>
+        <p:spPr/>
         <p:txBody>
           <a:bodyPr anchor="b" anchorCtr="0"/>
           <a:p>
@@ -6968,9 +6914,7 @@
             <p:ph type="body" idx="1"/>
           </p:nvPr>
         </p:nvSpPr>
-        <p:spPr>
-          <a:ln/>
-        </p:spPr>
+        <p:spPr/>
         <p:txBody>
           <a:bodyPr/>
           <a:p>
@@ -7071,9 +7015,7 @@
             <p:ph type="title"/>
           </p:nvPr>
         </p:nvSpPr>
-        <p:spPr>
-          <a:ln/>
-        </p:spPr>
+        <p:spPr/>
         <p:txBody>
           <a:bodyPr anchor="b" anchorCtr="0"/>
           <a:p>
@@ -7093,9 +7035,7 @@
             <p:ph type="body" idx="1"/>
           </p:nvPr>
         </p:nvSpPr>
-        <p:spPr>
-          <a:ln/>
-        </p:spPr>
+        <p:spPr/>
         <p:txBody>
           <a:bodyPr/>
           <a:p>
@@ -7209,9 +7149,7 @@
             <p:ph type="title"/>
           </p:nvPr>
         </p:nvSpPr>
-        <p:spPr>
-          <a:ln/>
-        </p:spPr>
+        <p:spPr/>
         <p:txBody>
           <a:bodyPr anchor="b" anchorCtr="0"/>
           <a:p>
@@ -7237,9 +7175,7 @@
             <p:ph type="body" idx="1"/>
           </p:nvPr>
         </p:nvSpPr>
-        <p:spPr>
-          <a:ln/>
-        </p:spPr>
+        <p:spPr/>
         <p:txBody>
           <a:bodyPr/>
           <a:p>
@@ -7305,9 +7241,7 @@
             <p:ph type="title"/>
           </p:nvPr>
         </p:nvSpPr>
-        <p:spPr>
-          <a:ln/>
-        </p:spPr>
+        <p:spPr/>
         <p:txBody>
           <a:bodyPr anchor="b" anchorCtr="0"/>
           <a:p>
@@ -7329,9 +7263,7 @@
             <p:ph type="body" idx="1"/>
           </p:nvPr>
         </p:nvSpPr>
-        <p:spPr>
-          <a:ln/>
-        </p:spPr>
+        <p:spPr/>
         <p:txBody>
           <a:bodyPr/>
           <a:p>
@@ -7569,9 +7501,7 @@
             <p:ph type="title"/>
           </p:nvPr>
         </p:nvSpPr>
-        <p:spPr>
-          <a:ln/>
-        </p:spPr>
+        <p:spPr/>
         <p:txBody>
           <a:bodyPr anchor="b" anchorCtr="0"/>
           <a:p>
@@ -7591,9 +7521,7 @@
             <p:ph type="body" idx="1"/>
           </p:nvPr>
         </p:nvSpPr>
-        <p:spPr>
-          <a:ln/>
-        </p:spPr>
+        <p:spPr/>
         <p:txBody>
           <a:bodyPr/>
           <a:p>
@@ -7804,6 +7732,751 @@
                 <a:schemeClr val="tx2"/>
               </a:solidFill>
             </a:endParaRPr>
+          </a:p>
+        </p:txBody>
+      </p:sp>
+    </p:spTree>
+  </p:cSld>
+  <p:clrMapOvr>
+    <a:masterClrMapping/>
+  </p:clrMapOvr>
+</p:sld>
+</file>
+
+<file path=ppt/slides/slide32.xml><?xml version="1.0" encoding="utf-8"?>
+<p:sld xmlns:a="http://schemas.openxmlformats.org/drawingml/2006/main" xmlns:r="http://schemas.openxmlformats.org/officeDocument/2006/relationships" xmlns:p="http://schemas.openxmlformats.org/presentationml/2006/main">
+  <p:cSld>
+    <p:spTree>
+      <p:nvGrpSpPr>
+        <p:cNvPr id="1" name=""/>
+        <p:cNvGrpSpPr/>
+        <p:nvPr/>
+      </p:nvGrpSpPr>
+      <p:grpSpPr/>
+      <p:sp>
+        <p:nvSpPr>
+          <p:cNvPr id="2" name="Title 1"/>
+          <p:cNvSpPr>
+            <a:spLocks noGrp="1"/>
+          </p:cNvSpPr>
+          <p:nvPr>
+            <p:ph type="title"/>
+          </p:nvPr>
+        </p:nvSpPr>
+        <p:spPr/>
+        <p:txBody>
+          <a:bodyPr/>
+          <a:p>
+            <a:r>
+              <a:rPr lang="en-IN" altLang="en-US"/>
+              <a:t>Concurrency Utilities</a:t>
+            </a:r>
+            <a:endParaRPr lang="en-IN" altLang="en-US"/>
+          </a:p>
+        </p:txBody>
+      </p:sp>
+      <p:sp>
+        <p:nvSpPr>
+          <p:cNvPr id="3" name="Content Placeholder 2"/>
+          <p:cNvSpPr>
+            <a:spLocks noGrp="1"/>
+          </p:cNvSpPr>
+          <p:nvPr>
+            <p:ph idx="1"/>
+          </p:nvPr>
+        </p:nvSpPr>
+        <p:spPr/>
+        <p:txBody>
+          <a:bodyPr/>
+          <a:p>
+            <a:r>
+              <a:rPr lang="en-US" altLang="en-US"/>
+              <a:t>Concurrency utilities in Java provide a robust framework to handle multi-threaded programming efficiently. Key utilities include Executors, Concurrent Collections, and CompletableFuture. Here's a detailed overview:</a:t>
+            </a:r>
+            <a:endParaRPr lang="en-US" altLang="en-US"/>
+          </a:p>
+          <a:p>
+            <a:endParaRPr lang="en-US" altLang="en-US"/>
+          </a:p>
+          <a:p>
+            <a:endParaRPr lang="en-US" altLang="en-US"/>
+          </a:p>
+        </p:txBody>
+      </p:sp>
+    </p:spTree>
+  </p:cSld>
+  <p:clrMapOvr>
+    <a:masterClrMapping/>
+  </p:clrMapOvr>
+</p:sld>
+</file>
+
+<file path=ppt/slides/slide33.xml><?xml version="1.0" encoding="utf-8"?>
+<p:sld xmlns:a="http://schemas.openxmlformats.org/drawingml/2006/main" xmlns:r="http://schemas.openxmlformats.org/officeDocument/2006/relationships" xmlns:p="http://schemas.openxmlformats.org/presentationml/2006/main">
+  <p:cSld>
+    <p:spTree>
+      <p:nvGrpSpPr>
+        <p:cNvPr id="1" name=""/>
+        <p:cNvGrpSpPr/>
+        <p:nvPr/>
+      </p:nvGrpSpPr>
+      <p:grpSpPr/>
+      <p:sp>
+        <p:nvSpPr>
+          <p:cNvPr id="2" name="Title 1"/>
+          <p:cNvSpPr>
+            <a:spLocks noGrp="1"/>
+          </p:cNvSpPr>
+          <p:nvPr>
+            <p:ph type="title"/>
+          </p:nvPr>
+        </p:nvSpPr>
+        <p:spPr/>
+        <p:txBody>
+          <a:bodyPr/>
+          <a:p>
+            <a:r>
+              <a:rPr lang="en-US" altLang="en-US">
+                <a:sym typeface="+mn-ea"/>
+              </a:rPr>
+              <a:t>1. Executors</a:t>
+            </a:r>
+            <a:endParaRPr lang="en-US"/>
+          </a:p>
+        </p:txBody>
+      </p:sp>
+      <p:sp>
+        <p:nvSpPr>
+          <p:cNvPr id="3" name="Content Placeholder 2"/>
+          <p:cNvSpPr>
+            <a:spLocks noGrp="1"/>
+          </p:cNvSpPr>
+          <p:nvPr>
+            <p:ph idx="1"/>
+          </p:nvPr>
+        </p:nvSpPr>
+        <p:spPr/>
+        <p:txBody>
+          <a:bodyPr/>
+          <a:p>
+            <a:r>
+              <a:rPr lang="en-US" altLang="en-US"/>
+              <a:t>The Executor Framework in java.util.concurrent simplifies thread management by abstracting thread creation and pooling.</a:t>
+            </a:r>
+            <a:endParaRPr lang="en-US" altLang="en-US"/>
+          </a:p>
+          <a:p>
+            <a:r>
+              <a:rPr lang="en-US" altLang="en-US"/>
+              <a:t>Key Components:</a:t>
+            </a:r>
+            <a:endParaRPr lang="en-US" altLang="en-US"/>
+          </a:p>
+          <a:p>
+            <a:pPr lvl="1"/>
+            <a:r>
+              <a:rPr lang="en-US" altLang="en-US"/>
+              <a:t>Executor Interface: Provides a method execute(Runnable command) to run a task.</a:t>
+            </a:r>
+            <a:endParaRPr lang="en-US" altLang="en-US"/>
+          </a:p>
+          <a:p>
+            <a:pPr lvl="1"/>
+            <a:r>
+              <a:rPr lang="en-US" altLang="en-US"/>
+              <a:t>ExecutorService: Extends Executor, adds lifecycle management (shutdown, awaitTermination), and supports task submission.</a:t>
+            </a:r>
+            <a:endParaRPr lang="en-US" altLang="en-US"/>
+          </a:p>
+          <a:p>
+            <a:pPr marL="0" indent="0">
+              <a:buNone/>
+            </a:pPr>
+            <a:endParaRPr lang="en-US" altLang="en-US"/>
+          </a:p>
+        </p:txBody>
+      </p:sp>
+    </p:spTree>
+  </p:cSld>
+  <p:clrMapOvr>
+    <a:masterClrMapping/>
+  </p:clrMapOvr>
+</p:sld>
+</file>
+
+<file path=ppt/slides/slide34.xml><?xml version="1.0" encoding="utf-8"?>
+<p:sld xmlns:a="http://schemas.openxmlformats.org/drawingml/2006/main" xmlns:r="http://schemas.openxmlformats.org/officeDocument/2006/relationships" xmlns:p="http://schemas.openxmlformats.org/presentationml/2006/main">
+  <p:cSld>
+    <p:spTree>
+      <p:nvGrpSpPr>
+        <p:cNvPr id="1" name=""/>
+        <p:cNvGrpSpPr/>
+        <p:nvPr/>
+      </p:nvGrpSpPr>
+      <p:grpSpPr/>
+      <p:sp>
+        <p:nvSpPr>
+          <p:cNvPr id="2" name="Title 1"/>
+          <p:cNvSpPr>
+            <a:spLocks noGrp="1"/>
+          </p:cNvSpPr>
+          <p:nvPr>
+            <p:ph type="title"/>
+          </p:nvPr>
+        </p:nvSpPr>
+        <p:spPr/>
+        <p:txBody>
+          <a:bodyPr/>
+          <a:p>
+            <a:endParaRPr lang="en-US"/>
+          </a:p>
+        </p:txBody>
+      </p:sp>
+      <p:sp>
+        <p:nvSpPr>
+          <p:cNvPr id="3" name="Content Placeholder 2"/>
+          <p:cNvSpPr>
+            <a:spLocks noGrp="1"/>
+          </p:cNvSpPr>
+          <p:nvPr>
+            <p:ph idx="1"/>
+          </p:nvPr>
+        </p:nvSpPr>
+        <p:spPr/>
+        <p:txBody>
+          <a:bodyPr/>
+          <a:p>
+            <a:pPr lvl="1"/>
+            <a:r>
+              <a:rPr lang="en-US" altLang="en-US" sz="2100">
+                <a:sym typeface="+mn-ea"/>
+              </a:rPr>
+              <a:t>FixedThreadPool: A pool with a fixed number of threads.</a:t>
+            </a:r>
+            <a:endParaRPr lang="en-US" altLang="en-US" sz="2100"/>
+          </a:p>
+          <a:p>
+            <a:pPr lvl="1"/>
+            <a:r>
+              <a:rPr lang="en-US" altLang="en-US" sz="2100">
+                <a:sym typeface="+mn-ea"/>
+              </a:rPr>
+              <a:t>CachedThreadPool: Dynamically creates threads as needed, reuses idle ones</a:t>
+            </a:r>
+            <a:r>
+              <a:rPr lang="en-IN" altLang="en-US" sz="2100">
+                <a:sym typeface="+mn-ea"/>
+              </a:rPr>
+              <a:t>, if idle for more 60 seconds, those will terminated automatically</a:t>
+            </a:r>
+            <a:r>
+              <a:rPr lang="en-US" altLang="en-US" sz="2100">
+                <a:sym typeface="+mn-ea"/>
+              </a:rPr>
+              <a:t>.</a:t>
+            </a:r>
+            <a:endParaRPr lang="en-US" altLang="en-US" sz="2100"/>
+          </a:p>
+          <a:p>
+            <a:pPr lvl="1"/>
+            <a:r>
+              <a:rPr lang="en-US" altLang="en-US" sz="2100">
+                <a:sym typeface="+mn-ea"/>
+              </a:rPr>
+              <a:t>SingleThreadExecutor: Executes tasks sequentially on a single thread.</a:t>
+            </a:r>
+            <a:endParaRPr lang="en-US" altLang="en-US" sz="2100"/>
+          </a:p>
+          <a:p>
+            <a:r>
+              <a:rPr lang="en-US" altLang="en-US" sz="2400">
+                <a:sym typeface="+mn-ea"/>
+              </a:rPr>
+              <a:t>ScheduledExecutorService: Allows scheduling tasks at fixed rates or delays.</a:t>
+            </a:r>
+            <a:endParaRPr lang="en-US" altLang="en-US" sz="2400">
+              <a:sym typeface="+mn-ea"/>
+            </a:endParaRPr>
+          </a:p>
+          <a:p>
+            <a:pPr lvl="1"/>
+            <a:r>
+              <a:rPr lang="en-US" altLang="en-US"/>
+              <a:t>newScheduledThreadPool</a:t>
+            </a:r>
+            <a:r>
+              <a:rPr lang="en-US" altLang="en-US" sz="2100">
+                <a:sym typeface="+mn-ea"/>
+              </a:rPr>
+              <a:t> </a:t>
+            </a:r>
+            <a:r>
+              <a:rPr lang="en-IN" altLang="en-US" sz="2100">
+                <a:sym typeface="+mn-ea"/>
+              </a:rPr>
+              <a:t>- create service with newScheduledThreadPool</a:t>
+            </a:r>
+            <a:endParaRPr lang="en-US" altLang="en-US"/>
+          </a:p>
+          <a:p>
+            <a:endParaRPr lang="en-US" altLang="en-US" sz="2400"/>
+          </a:p>
+          <a:p>
+            <a:endParaRPr lang="en-US" sz="2400"/>
+          </a:p>
+        </p:txBody>
+      </p:sp>
+    </p:spTree>
+  </p:cSld>
+  <p:clrMapOvr>
+    <a:masterClrMapping/>
+  </p:clrMapOvr>
+</p:sld>
+</file>
+
+<file path=ppt/slides/slide35.xml><?xml version="1.0" encoding="utf-8"?>
+<p:sld xmlns:a="http://schemas.openxmlformats.org/drawingml/2006/main" xmlns:r="http://schemas.openxmlformats.org/officeDocument/2006/relationships" xmlns:p="http://schemas.openxmlformats.org/presentationml/2006/main">
+  <p:cSld>
+    <p:spTree>
+      <p:nvGrpSpPr>
+        <p:cNvPr id="1" name=""/>
+        <p:cNvGrpSpPr/>
+        <p:nvPr/>
+      </p:nvGrpSpPr>
+      <p:grpSpPr/>
+      <p:sp>
+        <p:nvSpPr>
+          <p:cNvPr id="2" name="Title 1"/>
+          <p:cNvSpPr>
+            <a:spLocks noGrp="1"/>
+          </p:cNvSpPr>
+          <p:nvPr>
+            <p:ph type="title"/>
+          </p:nvPr>
+        </p:nvSpPr>
+        <p:spPr/>
+        <p:txBody>
+          <a:bodyPr/>
+          <a:p>
+            <a:endParaRPr lang="en-US"/>
+          </a:p>
+        </p:txBody>
+      </p:sp>
+      <p:sp>
+        <p:nvSpPr>
+          <p:cNvPr id="3" name="Content Placeholder 2"/>
+          <p:cNvSpPr>
+            <a:spLocks noGrp="1"/>
+          </p:cNvSpPr>
+          <p:nvPr>
+            <p:ph idx="1"/>
+          </p:nvPr>
+        </p:nvSpPr>
+        <p:spPr/>
+        <p:txBody>
+          <a:bodyPr/>
+          <a:p>
+            <a:r>
+              <a:rPr lang="en-US" altLang="en-US" sz="2400"/>
+              <a:t>ExecutorService executor = Executors.newFixedThreadPool(3);</a:t>
+            </a:r>
+            <a:endParaRPr lang="en-US" altLang="en-US" sz="2400"/>
+          </a:p>
+          <a:p>
+            <a:r>
+              <a:rPr lang="en-US" altLang="en-US" sz="2400"/>
+              <a:t>executor.submit(() -&gt; {</a:t>
+            </a:r>
+            <a:endParaRPr lang="en-US" altLang="en-US" sz="2400"/>
+          </a:p>
+          <a:p>
+            <a:r>
+              <a:rPr lang="en-US" altLang="en-US" sz="2400"/>
+              <a:t>    System.out.println("Task executed by: " + Thread.currentThread().getName());</a:t>
+            </a:r>
+            <a:endParaRPr lang="en-US" altLang="en-US" sz="2400"/>
+          </a:p>
+          <a:p>
+            <a:r>
+              <a:rPr lang="en-US" altLang="en-US" sz="2400"/>
+              <a:t>});</a:t>
+            </a:r>
+            <a:endParaRPr lang="en-US" altLang="en-US" sz="2400"/>
+          </a:p>
+          <a:p>
+            <a:r>
+              <a:rPr lang="en-US" altLang="en-US" sz="2400"/>
+              <a:t>executor.shutdown();</a:t>
+            </a:r>
+            <a:endParaRPr lang="en-US" altLang="en-US" sz="2400"/>
+          </a:p>
+          <a:p>
+            <a:endParaRPr lang="en-US" altLang="en-US" sz="2400"/>
+          </a:p>
+        </p:txBody>
+      </p:sp>
+    </p:spTree>
+  </p:cSld>
+  <p:clrMapOvr>
+    <a:masterClrMapping/>
+  </p:clrMapOvr>
+</p:sld>
+</file>
+
+<file path=ppt/slides/slide36.xml><?xml version="1.0" encoding="utf-8"?>
+<p:sld xmlns:a="http://schemas.openxmlformats.org/drawingml/2006/main" xmlns:r="http://schemas.openxmlformats.org/officeDocument/2006/relationships" xmlns:p="http://schemas.openxmlformats.org/presentationml/2006/main">
+  <p:cSld>
+    <p:spTree>
+      <p:nvGrpSpPr>
+        <p:cNvPr id="1" name=""/>
+        <p:cNvGrpSpPr/>
+        <p:nvPr/>
+      </p:nvGrpSpPr>
+      <p:grpSpPr/>
+      <p:sp>
+        <p:nvSpPr>
+          <p:cNvPr id="2" name="Title 1"/>
+          <p:cNvSpPr>
+            <a:spLocks noGrp="1"/>
+          </p:cNvSpPr>
+          <p:nvPr>
+            <p:ph type="title"/>
+          </p:nvPr>
+        </p:nvSpPr>
+        <p:spPr/>
+        <p:txBody>
+          <a:bodyPr/>
+          <a:p>
+            <a:r>
+              <a:rPr lang="en-US" altLang="en-US">
+                <a:sym typeface="+mn-ea"/>
+              </a:rPr>
+              <a:t>Concurrent Collections</a:t>
+            </a:r>
+            <a:endParaRPr lang="en-US"/>
+          </a:p>
+        </p:txBody>
+      </p:sp>
+      <p:sp>
+        <p:nvSpPr>
+          <p:cNvPr id="3" name="Content Placeholder 2"/>
+          <p:cNvSpPr>
+            <a:spLocks noGrp="1"/>
+          </p:cNvSpPr>
+          <p:nvPr>
+            <p:ph idx="1"/>
+          </p:nvPr>
+        </p:nvSpPr>
+        <p:spPr/>
+        <p:txBody>
+          <a:bodyPr/>
+          <a:p>
+            <a:pPr marL="0" indent="0">
+              <a:buNone/>
+            </a:pPr>
+            <a:r>
+              <a:rPr lang="en-US" altLang="en-US"/>
+              <a:t>Concurrent Collections in java.util.concurrent are thread-safe alternatives to traditional collections.</a:t>
+            </a:r>
+            <a:endParaRPr lang="en-US" altLang="en-US"/>
+          </a:p>
+          <a:p>
+            <a:r>
+              <a:rPr lang="en-US" altLang="en-US"/>
+              <a:t>Key Classes:</a:t>
+            </a:r>
+            <a:endParaRPr lang="en-US" altLang="en-US"/>
+          </a:p>
+          <a:p>
+            <a:pPr lvl="1"/>
+            <a:r>
+              <a:rPr lang="en-US" altLang="en-US"/>
+              <a:t>ConcurrentHashMap: High-performance thread-safe hash map with segment-based locking.</a:t>
+            </a:r>
+            <a:endParaRPr lang="en-US" altLang="en-US"/>
+          </a:p>
+          <a:p>
+            <a:pPr lvl="1"/>
+            <a:r>
+              <a:rPr lang="en-US" altLang="en-US"/>
+              <a:t>CopyOnWriteArrayList: A thread-safe ArrayList where all mutative operations create a new copy.</a:t>
+            </a:r>
+            <a:endParaRPr lang="en-US" altLang="en-US"/>
+          </a:p>
+          <a:p>
+            <a:pPr marL="0" indent="0">
+              <a:buNone/>
+            </a:pPr>
+            <a:endParaRPr lang="en-US" altLang="en-US"/>
+          </a:p>
+        </p:txBody>
+      </p:sp>
+    </p:spTree>
+  </p:cSld>
+  <p:clrMapOvr>
+    <a:masterClrMapping/>
+  </p:clrMapOvr>
+</p:sld>
+</file>
+
+<file path=ppt/slides/slide37.xml><?xml version="1.0" encoding="utf-8"?>
+<p:sld xmlns:a="http://schemas.openxmlformats.org/drawingml/2006/main" xmlns:r="http://schemas.openxmlformats.org/officeDocument/2006/relationships" xmlns:p="http://schemas.openxmlformats.org/presentationml/2006/main">
+  <p:cSld>
+    <p:spTree>
+      <p:nvGrpSpPr>
+        <p:cNvPr id="1" name=""/>
+        <p:cNvGrpSpPr/>
+        <p:nvPr/>
+      </p:nvGrpSpPr>
+      <p:grpSpPr/>
+      <p:sp>
+        <p:nvSpPr>
+          <p:cNvPr id="2" name="Title 1"/>
+          <p:cNvSpPr>
+            <a:spLocks noGrp="1"/>
+          </p:cNvSpPr>
+          <p:nvPr>
+            <p:ph type="title"/>
+          </p:nvPr>
+        </p:nvSpPr>
+        <p:spPr/>
+        <p:txBody>
+          <a:bodyPr/>
+          <a:p>
+            <a:endParaRPr lang="en-US"/>
+          </a:p>
+        </p:txBody>
+      </p:sp>
+      <p:sp>
+        <p:nvSpPr>
+          <p:cNvPr id="3" name="Content Placeholder 2"/>
+          <p:cNvSpPr>
+            <a:spLocks noGrp="1"/>
+          </p:cNvSpPr>
+          <p:nvPr>
+            <p:ph idx="1"/>
+          </p:nvPr>
+        </p:nvSpPr>
+        <p:spPr/>
+        <p:txBody>
+          <a:bodyPr/>
+          <a:p>
+            <a:r>
+              <a:rPr lang="en-US" altLang="en-US">
+                <a:sym typeface="+mn-ea"/>
+              </a:rPr>
+              <a:t>BlockingQueue: Provides thread-safe queues like ArrayBlockingQueue, LinkedBlockingQueue, and PriorityBlockingQueue.</a:t>
+            </a:r>
+            <a:endParaRPr lang="en-US" altLang="en-US"/>
+          </a:p>
+          <a:p>
+            <a:r>
+              <a:rPr lang="en-US" altLang="en-US">
+                <a:sym typeface="+mn-ea"/>
+              </a:rPr>
+              <a:t>ConcurrentSkipListSet/Map: Thread-safe implementations of sorted sets/maps.</a:t>
+            </a:r>
+            <a:endParaRPr lang="en-US" altLang="en-US"/>
+          </a:p>
+          <a:p>
+            <a:endParaRPr lang="en-US"/>
+          </a:p>
+        </p:txBody>
+      </p:sp>
+    </p:spTree>
+  </p:cSld>
+  <p:clrMapOvr>
+    <a:masterClrMapping/>
+  </p:clrMapOvr>
+</p:sld>
+</file>
+
+<file path=ppt/slides/slide38.xml><?xml version="1.0" encoding="utf-8"?>
+<p:sld xmlns:a="http://schemas.openxmlformats.org/drawingml/2006/main" xmlns:r="http://schemas.openxmlformats.org/officeDocument/2006/relationships" xmlns:p="http://schemas.openxmlformats.org/presentationml/2006/main">
+  <p:cSld>
+    <p:spTree>
+      <p:nvGrpSpPr>
+        <p:cNvPr id="1" name=""/>
+        <p:cNvGrpSpPr/>
+        <p:nvPr/>
+      </p:nvGrpSpPr>
+      <p:grpSpPr/>
+      <p:sp>
+        <p:nvSpPr>
+          <p:cNvPr id="2" name="Title 1"/>
+          <p:cNvSpPr>
+            <a:spLocks noGrp="1"/>
+          </p:cNvSpPr>
+          <p:nvPr>
+            <p:ph type="title"/>
+          </p:nvPr>
+        </p:nvSpPr>
+        <p:spPr/>
+        <p:txBody>
+          <a:bodyPr/>
+          <a:p>
+            <a:r>
+              <a:rPr lang="en-US" altLang="en-US">
+                <a:sym typeface="+mn-ea"/>
+              </a:rPr>
+              <a:t>Example: ConcurrentHashMap</a:t>
+            </a:r>
+            <a:endParaRPr lang="en-US"/>
+          </a:p>
+        </p:txBody>
+      </p:sp>
+      <p:sp>
+        <p:nvSpPr>
+          <p:cNvPr id="3" name="Content Placeholder 2"/>
+          <p:cNvSpPr>
+            <a:spLocks noGrp="1"/>
+          </p:cNvSpPr>
+          <p:nvPr>
+            <p:ph idx="1"/>
+          </p:nvPr>
+        </p:nvSpPr>
+        <p:spPr/>
+        <p:txBody>
+          <a:bodyPr/>
+          <a:p>
+            <a:r>
+              <a:rPr lang="en-US" altLang="en-US" sz="2400"/>
+              <a:t>ConcurrentHashMap&lt;String, Integer&gt; map = new ConcurrentHashMap&lt;&gt;();</a:t>
+            </a:r>
+            <a:endParaRPr lang="en-US" altLang="en-US" sz="2400"/>
+          </a:p>
+          <a:p>
+            <a:r>
+              <a:rPr lang="en-US" altLang="en-US" sz="2400"/>
+              <a:t>map.put("One", 1);</a:t>
+            </a:r>
+            <a:endParaRPr lang="en-US" altLang="en-US" sz="2400"/>
+          </a:p>
+          <a:p>
+            <a:r>
+              <a:rPr lang="en-US" altLang="en-US" sz="2400"/>
+              <a:t>map.put("Two", 2);</a:t>
+            </a:r>
+            <a:endParaRPr lang="en-US" altLang="en-US" sz="2400"/>
+          </a:p>
+          <a:p>
+            <a:r>
+              <a:rPr lang="en-US" altLang="en-US" sz="2400"/>
+              <a:t>map.forEach((key, value) -&gt; System.out.println(key + ": " + value));</a:t>
+            </a:r>
+            <a:endParaRPr lang="en-US" altLang="en-US" sz="2400"/>
+          </a:p>
+          <a:p>
+            <a:endParaRPr lang="en-US" altLang="en-US" sz="2400"/>
+          </a:p>
+        </p:txBody>
+      </p:sp>
+    </p:spTree>
+  </p:cSld>
+  <p:clrMapOvr>
+    <a:masterClrMapping/>
+  </p:clrMapOvr>
+</p:sld>
+</file>
+
+<file path=ppt/slides/slide39.xml><?xml version="1.0" encoding="utf-8"?>
+<p:sld xmlns:a="http://schemas.openxmlformats.org/drawingml/2006/main" xmlns:r="http://schemas.openxmlformats.org/officeDocument/2006/relationships" xmlns:p="http://schemas.openxmlformats.org/presentationml/2006/main">
+  <p:cSld>
+    <p:spTree>
+      <p:nvGrpSpPr>
+        <p:cNvPr id="1" name=""/>
+        <p:cNvGrpSpPr/>
+        <p:nvPr/>
+      </p:nvGrpSpPr>
+      <p:grpSpPr/>
+      <p:sp>
+        <p:nvSpPr>
+          <p:cNvPr id="2" name="Title 1"/>
+          <p:cNvSpPr>
+            <a:spLocks noGrp="1"/>
+          </p:cNvSpPr>
+          <p:nvPr>
+            <p:ph type="title"/>
+          </p:nvPr>
+        </p:nvSpPr>
+        <p:spPr/>
+        <p:txBody>
+          <a:bodyPr/>
+          <a:p>
+            <a:r>
+              <a:rPr lang="en-US" altLang="en-US">
+                <a:sym typeface="+mn-ea"/>
+              </a:rPr>
+              <a:t>3. CompletableFuture</a:t>
+            </a:r>
+            <a:endParaRPr lang="en-US"/>
+          </a:p>
+        </p:txBody>
+      </p:sp>
+      <p:sp>
+        <p:nvSpPr>
+          <p:cNvPr id="3" name="Content Placeholder 2"/>
+          <p:cNvSpPr>
+            <a:spLocks noGrp="1"/>
+          </p:cNvSpPr>
+          <p:nvPr>
+            <p:ph idx="1"/>
+          </p:nvPr>
+        </p:nvSpPr>
+        <p:spPr/>
+        <p:txBody>
+          <a:bodyPr/>
+          <a:p>
+            <a:r>
+              <a:rPr lang="en-US" altLang="en-US"/>
+              <a:t>Introduced in Java 8, CompletableFuture is a powerful tool for asynchronous programming. It supports non-blocking, functional-style callbacks and chaining.</a:t>
+            </a:r>
+            <a:endParaRPr lang="en-US" altLang="en-US"/>
+          </a:p>
+          <a:p>
+            <a:r>
+              <a:rPr lang="en-US" altLang="en-US"/>
+              <a:t>Key Features:</a:t>
+            </a:r>
+            <a:endParaRPr lang="en-US" altLang="en-US"/>
+          </a:p>
+          <a:p>
+            <a:pPr lvl="1"/>
+            <a:r>
+              <a:rPr lang="en-US" altLang="en-US"/>
+              <a:t>Chaining Tasks:</a:t>
+            </a:r>
+            <a:endParaRPr lang="en-US" altLang="en-US"/>
+          </a:p>
+          <a:p>
+            <a:pPr lvl="2"/>
+            <a:r>
+              <a:rPr lang="en-US" altLang="en-US"/>
+              <a:t>thenApply: Transforms a result.</a:t>
+            </a:r>
+            <a:endParaRPr lang="en-US" altLang="en-US"/>
+          </a:p>
+          <a:p>
+            <a:pPr lvl="2"/>
+            <a:r>
+              <a:rPr lang="en-US" altLang="en-US"/>
+              <a:t>thenAccept: Consumes a result.</a:t>
+            </a:r>
+            <a:endParaRPr lang="en-US" altLang="en-US"/>
+          </a:p>
+          <a:p>
+            <a:pPr lvl="2"/>
+            <a:r>
+              <a:rPr lang="en-US" altLang="en-US"/>
+              <a:t>thenCompose: Flattens nested futures.</a:t>
+            </a:r>
+            <a:endParaRPr lang="en-US" altLang="en-US"/>
+          </a:p>
+          <a:p>
+            <a:pPr marL="0" indent="0">
+              <a:buNone/>
+            </a:pPr>
+            <a:endParaRPr lang="en-US" altLang="en-US"/>
           </a:p>
         </p:txBody>
       </p:sp>
@@ -7835,9 +8508,7 @@
             <p:ph type="title"/>
           </p:nvPr>
         </p:nvSpPr>
-        <p:spPr>
-          <a:ln/>
-        </p:spPr>
+        <p:spPr/>
         <p:txBody>
           <a:bodyPr anchor="b" anchorCtr="0"/>
           <a:p>
@@ -7845,6 +8516,7 @@
               <a:rPr lang="en-AU" altLang="en-AU"/>
               <a:t>Java Threads &amp; Synchronization</a:t>
             </a:r>
+            <a:endParaRPr lang="en-AU" altLang="en-AU"/>
           </a:p>
         </p:txBody>
       </p:sp>
@@ -7858,9 +8530,7 @@
             <p:ph type="body" idx="1"/>
           </p:nvPr>
         </p:nvSpPr>
-        <p:spPr>
-          <a:ln/>
-        </p:spPr>
+        <p:spPr/>
         <p:txBody>
           <a:bodyPr/>
           <a:p>
@@ -7966,9 +8636,441 @@
               </a:rPr>
               <a:t>Assignment</a:t>
             </a:r>
-          </a:p>
-        </p:txBody>
-      </p:sp>
+            <a:endParaRPr lang="en-GB" altLang="x-none" sz="2400">
+              <a:ea typeface="SimSun" panose="02010600030101010101" pitchFamily="2" charset="-122"/>
+            </a:endParaRPr>
+          </a:p>
+        </p:txBody>
+      </p:sp>
+    </p:spTree>
+  </p:cSld>
+  <p:clrMapOvr>
+    <a:masterClrMapping/>
+  </p:clrMapOvr>
+</p:sld>
+</file>
+
+<file path=ppt/slides/slide40.xml><?xml version="1.0" encoding="utf-8"?>
+<p:sld xmlns:a="http://schemas.openxmlformats.org/drawingml/2006/main" xmlns:r="http://schemas.openxmlformats.org/officeDocument/2006/relationships" xmlns:p="http://schemas.openxmlformats.org/presentationml/2006/main">
+  <p:cSld>
+    <p:spTree>
+      <p:nvGrpSpPr>
+        <p:cNvPr id="1" name=""/>
+        <p:cNvGrpSpPr/>
+        <p:nvPr/>
+      </p:nvGrpSpPr>
+      <p:grpSpPr/>
+      <p:sp>
+        <p:nvSpPr>
+          <p:cNvPr id="2" name="Title 1"/>
+          <p:cNvSpPr>
+            <a:spLocks noGrp="1"/>
+          </p:cNvSpPr>
+          <p:nvPr>
+            <p:ph type="title"/>
+          </p:nvPr>
+        </p:nvSpPr>
+        <p:spPr/>
+        <p:txBody>
+          <a:bodyPr/>
+          <a:p>
+            <a:endParaRPr lang="en-US"/>
+          </a:p>
+        </p:txBody>
+      </p:sp>
+      <p:sp>
+        <p:nvSpPr>
+          <p:cNvPr id="3" name="Content Placeholder 2"/>
+          <p:cNvSpPr>
+            <a:spLocks noGrp="1"/>
+          </p:cNvSpPr>
+          <p:nvPr>
+            <p:ph idx="1"/>
+          </p:nvPr>
+        </p:nvSpPr>
+        <p:spPr/>
+        <p:txBody>
+          <a:bodyPr/>
+          <a:p>
+            <a:r>
+              <a:rPr lang="en-US" altLang="en-US">
+                <a:sym typeface="+mn-ea"/>
+              </a:rPr>
+              <a:t>Combining Tasks:</a:t>
+            </a:r>
+            <a:endParaRPr lang="en-US" altLang="en-US"/>
+          </a:p>
+          <a:p>
+            <a:pPr lvl="1"/>
+            <a:r>
+              <a:rPr lang="en-US" altLang="en-US">
+                <a:sym typeface="+mn-ea"/>
+              </a:rPr>
+              <a:t>thenCombine: Combines two futures.</a:t>
+            </a:r>
+            <a:endParaRPr lang="en-US" altLang="en-US"/>
+          </a:p>
+          <a:p>
+            <a:pPr lvl="1"/>
+            <a:r>
+              <a:rPr lang="en-US" altLang="en-US">
+                <a:sym typeface="+mn-ea"/>
+              </a:rPr>
+              <a:t>allOf: Waits for multiple futures to complete.</a:t>
+            </a:r>
+            <a:endParaRPr lang="en-US" altLang="en-US"/>
+          </a:p>
+          <a:p>
+            <a:pPr lvl="1"/>
+            <a:r>
+              <a:rPr lang="en-US" altLang="en-US">
+                <a:sym typeface="+mn-ea"/>
+              </a:rPr>
+              <a:t>anyOf: Completes when any future completes.</a:t>
+            </a:r>
+            <a:endParaRPr lang="en-US" altLang="en-US"/>
+          </a:p>
+          <a:p>
+            <a:r>
+              <a:rPr lang="en-US" altLang="en-US">
+                <a:sym typeface="+mn-ea"/>
+              </a:rPr>
+              <a:t>Exception Handling:</a:t>
+            </a:r>
+            <a:endParaRPr lang="en-US" altLang="en-US"/>
+          </a:p>
+          <a:p>
+            <a:pPr lvl="1"/>
+            <a:r>
+              <a:rPr lang="en-US" altLang="en-US">
+                <a:sym typeface="+mn-ea"/>
+              </a:rPr>
+              <a:t>exceptionally: Handles exceptions.</a:t>
+            </a:r>
+            <a:endParaRPr lang="en-US" altLang="en-US"/>
+          </a:p>
+          <a:p>
+            <a:pPr lvl="1"/>
+            <a:r>
+              <a:rPr lang="en-US" altLang="en-US">
+                <a:sym typeface="+mn-ea"/>
+              </a:rPr>
+              <a:t>handle: Handles both result and exception.</a:t>
+            </a:r>
+            <a:endParaRPr lang="en-US" altLang="en-US"/>
+          </a:p>
+          <a:p>
+            <a:endParaRPr lang="en-US"/>
+          </a:p>
+        </p:txBody>
+      </p:sp>
+    </p:spTree>
+  </p:cSld>
+  <p:clrMapOvr>
+    <a:masterClrMapping/>
+  </p:clrMapOvr>
+</p:sld>
+</file>
+
+<file path=ppt/slides/slide41.xml><?xml version="1.0" encoding="utf-8"?>
+<p:sld xmlns:a="http://schemas.openxmlformats.org/drawingml/2006/main" xmlns:r="http://schemas.openxmlformats.org/officeDocument/2006/relationships" xmlns:p="http://schemas.openxmlformats.org/presentationml/2006/main">
+  <p:cSld>
+    <p:spTree>
+      <p:nvGrpSpPr>
+        <p:cNvPr id="1" name=""/>
+        <p:cNvGrpSpPr/>
+        <p:nvPr/>
+      </p:nvGrpSpPr>
+      <p:grpSpPr/>
+      <p:sp>
+        <p:nvSpPr>
+          <p:cNvPr id="2" name="Title 1"/>
+          <p:cNvSpPr>
+            <a:spLocks noGrp="1"/>
+          </p:cNvSpPr>
+          <p:nvPr>
+            <p:ph type="title"/>
+          </p:nvPr>
+        </p:nvSpPr>
+        <p:spPr/>
+        <p:txBody>
+          <a:bodyPr/>
+          <a:p>
+            <a:endParaRPr lang="en-US"/>
+          </a:p>
+        </p:txBody>
+      </p:sp>
+      <p:sp>
+        <p:nvSpPr>
+          <p:cNvPr id="3" name="Content Placeholder 2"/>
+          <p:cNvSpPr>
+            <a:spLocks noGrp="1"/>
+          </p:cNvSpPr>
+          <p:nvPr>
+            <p:ph idx="1"/>
+          </p:nvPr>
+        </p:nvSpPr>
+        <p:spPr/>
+        <p:txBody>
+          <a:bodyPr/>
+          <a:p>
+            <a:r>
+              <a:rPr lang="en-US" altLang="en-US" sz="2400"/>
+              <a:t>CompletableFuture.supplyAsync(() -&gt; {</a:t>
+            </a:r>
+            <a:endParaRPr lang="en-US" altLang="en-US" sz="2400"/>
+          </a:p>
+          <a:p>
+            <a:r>
+              <a:rPr lang="en-US" altLang="en-US" sz="2400"/>
+              <a:t>    System.out.println("Task running on: " + Thread.currentThread().getName());</a:t>
+            </a:r>
+            <a:endParaRPr lang="en-US" altLang="en-US" sz="2400"/>
+          </a:p>
+          <a:p>
+            <a:r>
+              <a:rPr lang="en-US" altLang="en-US" sz="2400"/>
+              <a:t>    return "Hello";</a:t>
+            </a:r>
+            <a:endParaRPr lang="en-US" altLang="en-US" sz="2400"/>
+          </a:p>
+          <a:p>
+            <a:r>
+              <a:rPr lang="en-US" altLang="en-US" sz="2400"/>
+              <a:t>}).thenApply(result -&gt; result + " World!")</a:t>
+            </a:r>
+            <a:endParaRPr lang="en-US" altLang="en-US" sz="2400"/>
+          </a:p>
+          <a:p>
+            <a:r>
+              <a:rPr lang="en-US" altLang="en-US" sz="2400"/>
+              <a:t>  .thenAccept(System.out::println)</a:t>
+            </a:r>
+            <a:endParaRPr lang="en-US" altLang="en-US" sz="2400"/>
+          </a:p>
+          <a:p>
+            <a:r>
+              <a:rPr lang="en-US" altLang="en-US" sz="2400"/>
+              <a:t>  .exceptionally(ex -&gt; {</a:t>
+            </a:r>
+            <a:endParaRPr lang="en-US" altLang="en-US" sz="2400"/>
+          </a:p>
+          <a:p>
+            <a:r>
+              <a:rPr lang="en-US" altLang="en-US" sz="2400"/>
+              <a:t>      System.err.println("Error: " + ex.getMessage());</a:t>
+            </a:r>
+            <a:endParaRPr lang="en-US" altLang="en-US" sz="2400"/>
+          </a:p>
+          <a:p>
+            <a:r>
+              <a:rPr lang="en-US" altLang="en-US" sz="2400"/>
+              <a:t>      return null;</a:t>
+            </a:r>
+            <a:endParaRPr lang="en-US" altLang="en-US" sz="2400"/>
+          </a:p>
+          <a:p>
+            <a:r>
+              <a:rPr lang="en-US" altLang="en-US" sz="2400"/>
+              <a:t>  });</a:t>
+            </a:r>
+            <a:endParaRPr lang="en-US" altLang="en-US" sz="2400"/>
+          </a:p>
+          <a:p>
+            <a:endParaRPr lang="en-US" altLang="en-US" sz="2400"/>
+          </a:p>
+        </p:txBody>
+      </p:sp>
+    </p:spTree>
+  </p:cSld>
+  <p:clrMapOvr>
+    <a:masterClrMapping/>
+  </p:clrMapOvr>
+</p:sld>
+</file>
+
+<file path=ppt/slides/slide42.xml><?xml version="1.0" encoding="utf-8"?>
+<p:sld xmlns:a="http://schemas.openxmlformats.org/drawingml/2006/main" xmlns:r="http://schemas.openxmlformats.org/officeDocument/2006/relationships" xmlns:p="http://schemas.openxmlformats.org/presentationml/2006/main">
+  <p:cSld>
+    <p:spTree>
+      <p:nvGrpSpPr>
+        <p:cNvPr id="1" name=""/>
+        <p:cNvGrpSpPr/>
+        <p:nvPr/>
+      </p:nvGrpSpPr>
+      <p:grpSpPr/>
+      <p:sp>
+        <p:nvSpPr>
+          <p:cNvPr id="2" name="Title 1"/>
+          <p:cNvSpPr>
+            <a:spLocks noGrp="1"/>
+          </p:cNvSpPr>
+          <p:nvPr>
+            <p:ph type="title"/>
+          </p:nvPr>
+        </p:nvSpPr>
+        <p:spPr/>
+        <p:txBody>
+          <a:bodyPr/>
+          <a:p>
+            <a:r>
+              <a:rPr lang="en-US" altLang="en-US"/>
+              <a:t>Benefits of Using These Utilities</a:t>
+            </a:r>
+            <a:endParaRPr lang="en-US" altLang="en-US"/>
+          </a:p>
+        </p:txBody>
+      </p:sp>
+      <p:sp>
+        <p:nvSpPr>
+          <p:cNvPr id="3" name="Content Placeholder 2"/>
+          <p:cNvSpPr>
+            <a:spLocks noGrp="1"/>
+          </p:cNvSpPr>
+          <p:nvPr>
+            <p:ph idx="1"/>
+          </p:nvPr>
+        </p:nvSpPr>
+        <p:spPr/>
+        <p:txBody>
+          <a:bodyPr/>
+          <a:p>
+            <a:r>
+              <a:rPr lang="en-US" altLang="en-US" sz="2400"/>
+              <a:t>Simplified Thread Management: Executors abstract thread creation and lifecycle management.</a:t>
+            </a:r>
+            <a:endParaRPr lang="en-US" altLang="en-US" sz="2400"/>
+          </a:p>
+          <a:p>
+            <a:r>
+              <a:rPr lang="en-US" altLang="en-US" sz="2400"/>
+              <a:t>Enhanced Performance: Concurrent collections minimize contention and optimize performance in multi-threaded scenarios.</a:t>
+            </a:r>
+            <a:endParaRPr lang="en-US" altLang="en-US" sz="2400"/>
+          </a:p>
+          <a:p>
+            <a:r>
+              <a:rPr lang="en-US" altLang="en-US" sz="2400"/>
+              <a:t>Ease of Asynchronous Programming: CompletableFuture enables non-blocking, readable code.</a:t>
+            </a:r>
+            <a:endParaRPr lang="en-US" altLang="en-US" sz="2400"/>
+          </a:p>
+          <a:p>
+            <a:endParaRPr lang="en-US" altLang="en-US" sz="2400"/>
+          </a:p>
+        </p:txBody>
+      </p:sp>
+    </p:spTree>
+  </p:cSld>
+  <p:clrMapOvr>
+    <a:masterClrMapping/>
+  </p:clrMapOvr>
+</p:sld>
+</file>
+
+<file path=ppt/slides/slide43.xml><?xml version="1.0" encoding="utf-8"?>
+<p:sld xmlns:a="http://schemas.openxmlformats.org/drawingml/2006/main" xmlns:r="http://schemas.openxmlformats.org/officeDocument/2006/relationships" xmlns:p="http://schemas.openxmlformats.org/presentationml/2006/main">
+  <p:cSld>
+    <p:spTree>
+      <p:nvGrpSpPr>
+        <p:cNvPr id="1" name=""/>
+        <p:cNvGrpSpPr/>
+        <p:nvPr/>
+      </p:nvGrpSpPr>
+      <p:grpSpPr/>
+      <p:sp>
+        <p:nvSpPr>
+          <p:cNvPr id="5" name="Title 4"/>
+          <p:cNvSpPr>
+            <a:spLocks noGrp="1"/>
+          </p:cNvSpPr>
+          <p:nvPr>
+            <p:ph type="title"/>
+          </p:nvPr>
+        </p:nvSpPr>
+        <p:spPr/>
+        <p:txBody>
+          <a:bodyPr/>
+          <a:p>
+            <a:endParaRPr lang="en-US"/>
+          </a:p>
+        </p:txBody>
+      </p:sp>
+      <p:graphicFrame>
+        <p:nvGraphicFramePr>
+          <p:cNvPr id="4" name="Content Placeholder 3"/>
+          <p:cNvGraphicFramePr/>
+          <p:nvPr>
+            <p:ph idx="1"/>
+          </p:nvPr>
+        </p:nvGraphicFramePr>
+        <p:xfrm>
+          <a:off x="1182688" y="2017713"/>
+          <a:ext cx="7772400" cy="190500"/>
+        </p:xfrm>
+        <a:graphic>
+          <a:graphicData uri="http://schemas.openxmlformats.org/drawingml/2006/table">
+            <a:tbl>
+              <a:tblPr/>
+              <a:tblGrid>
+                <a:gridCol w="7772400"/>
+              </a:tblGrid>
+              <a:tr h="190500">
+                <a:tc>
+                  <a:txBody>
+                    <a:bodyPr/>
+                    <a:p>
+                      <a:pPr algn="l" fontAlgn="ctr"/>
+                      <a:endParaRPr sz="1200" b="0" i="0">
+                        <a:solidFill>
+                          <a:srgbClr val="000000"/>
+                        </a:solidFill>
+                        <a:latin typeface="Aptos Narrow"/>
+                        <a:ea typeface="Aptos Narrow"/>
+                      </a:endParaRPr>
+                    </a:p>
+                  </a:txBody>
+                  <a:tcPr marL="7937" marR="7937" marT="7937" marB="0" anchor="ctr" anchorCtr="0">
+                    <a:lnL w="6350" cap="flat" cmpd="sng">
+                      <a:solidFill>
+                        <a:srgbClr val="000000"/>
+                      </a:solidFill>
+                      <a:prstDash val="solid"/>
+                      <a:headEnd type="none" w="med" len="med"/>
+                      <a:tailEnd type="none" w="med" len="med"/>
+                    </a:lnL>
+                    <a:lnR w="6350" cap="flat" cmpd="sng">
+                      <a:solidFill>
+                        <a:srgbClr val="000000"/>
+                      </a:solidFill>
+                      <a:prstDash val="solid"/>
+                      <a:headEnd type="none" w="med" len="med"/>
+                      <a:tailEnd type="none" w="med" len="med"/>
+                    </a:lnR>
+                    <a:lnT w="6350" cap="flat" cmpd="sng">
+                      <a:solidFill>
+                        <a:srgbClr val="000000"/>
+                      </a:solidFill>
+                      <a:prstDash val="solid"/>
+                      <a:headEnd type="none" w="med" len="med"/>
+                      <a:tailEnd type="none" w="med" len="med"/>
+                    </a:lnT>
+                    <a:lnB w="6350" cap="flat" cmpd="sng">
+                      <a:solidFill>
+                        <a:srgbClr val="000000"/>
+                      </a:solidFill>
+                      <a:prstDash val="solid"/>
+                      <a:headEnd type="none" w="med" len="med"/>
+                      <a:tailEnd type="none" w="med" len="med"/>
+                    </a:lnB>
+                    <a:noFill/>
+                  </a:tcPr>
+                </a:tc>
+              </a:tr>
+            </a:tbl>
+          </a:graphicData>
+        </a:graphic>
+      </p:graphicFrame>
     </p:spTree>
   </p:cSld>
   <p:clrMapOvr>
@@ -7997,9 +9099,7 @@
             <p:ph type="title"/>
           </p:nvPr>
         </p:nvSpPr>
-        <p:spPr>
-          <a:ln/>
-        </p:spPr>
+        <p:spPr/>
         <p:txBody>
           <a:bodyPr anchor="b" anchorCtr="0"/>
           <a:p>
@@ -8025,9 +9125,7 @@
             <p:ph type="body" idx="1"/>
           </p:nvPr>
         </p:nvSpPr>
-        <p:spPr>
-          <a:ln/>
-        </p:spPr>
+        <p:spPr/>
         <p:txBody>
           <a:bodyPr/>
           <a:p>
@@ -8116,9 +9214,7 @@
             <p:ph type="title"/>
           </p:nvPr>
         </p:nvSpPr>
-        <p:spPr>
-          <a:ln/>
-        </p:spPr>
+        <p:spPr/>
         <p:txBody>
           <a:bodyPr anchor="b" anchorCtr="0"/>
           <a:p>
@@ -8145,7 +9241,6 @@
             <a:off x="4191000" y="2017713"/>
             <a:ext cx="4764088" cy="4114800"/>
           </a:xfrm>
-          <a:ln/>
         </p:spPr>
         <p:txBody>
           <a:bodyPr/>
@@ -8312,9 +9407,7 @@
             <p:ph type="title"/>
           </p:nvPr>
         </p:nvSpPr>
-        <p:spPr>
-          <a:ln/>
-        </p:spPr>
+        <p:spPr/>
         <p:txBody>
           <a:bodyPr anchor="b" anchorCtr="0"/>
           <a:p>
@@ -8336,9 +9429,7 @@
             <p:ph type="body" idx="1"/>
           </p:nvPr>
         </p:nvSpPr>
-        <p:spPr>
-          <a:ln/>
-        </p:spPr>
+        <p:spPr/>
         <p:txBody>
           <a:bodyPr/>
           <a:p>
@@ -8497,9 +9588,7 @@
             <p:ph type="title"/>
           </p:nvPr>
         </p:nvSpPr>
-        <p:spPr>
-          <a:ln/>
-        </p:spPr>
+        <p:spPr/>
         <p:txBody>
           <a:bodyPr anchor="b" anchorCtr="0"/>
           <a:p>
@@ -8519,9 +9608,7 @@
             <p:ph type="body" idx="1"/>
           </p:nvPr>
         </p:nvSpPr>
-        <p:spPr>
-          <a:ln/>
-        </p:spPr>
+        <p:spPr/>
         <p:txBody>
           <a:bodyPr/>
           <a:p>
@@ -8615,9 +9702,7 @@
             <p:ph type="title"/>
           </p:nvPr>
         </p:nvSpPr>
-        <p:spPr>
-          <a:ln/>
-        </p:spPr>
+        <p:spPr/>
         <p:txBody>
           <a:bodyPr anchor="b" anchorCtr="0"/>
           <a:p>
@@ -8637,9 +9722,7 @@
             <p:ph type="body" idx="1"/>
           </p:nvPr>
         </p:nvSpPr>
-        <p:spPr>
-          <a:ln/>
-        </p:spPr>
+        <p:spPr/>
         <p:txBody>
           <a:bodyPr/>
           <a:p>

</xml_diff>